<commit_message>
stefanie chart and company description in power point
</commit_message>
<xml_diff>
--- a/AAPL v AMZN v GOOG.pptx
+++ b/AAPL v AMZN v GOOG.pptx
@@ -6,17 +6,20 @@
   </p:sldMasterIdLst>
   <p:sldIdLst>
     <p:sldId id="256" r:id="rId2"/>
-    <p:sldId id="257" r:id="rId3"/>
-    <p:sldId id="258" r:id="rId4"/>
-    <p:sldId id="259" r:id="rId5"/>
-    <p:sldId id="260" r:id="rId6"/>
-    <p:sldId id="261" r:id="rId7"/>
-    <p:sldId id="262" r:id="rId8"/>
-    <p:sldId id="263" r:id="rId9"/>
-    <p:sldId id="264" r:id="rId10"/>
-    <p:sldId id="265" r:id="rId11"/>
-    <p:sldId id="266" r:id="rId12"/>
-    <p:sldId id="267" r:id="rId13"/>
+    <p:sldId id="272" r:id="rId3"/>
+    <p:sldId id="257" r:id="rId4"/>
+    <p:sldId id="258" r:id="rId5"/>
+    <p:sldId id="259" r:id="rId6"/>
+    <p:sldId id="260" r:id="rId7"/>
+    <p:sldId id="268" r:id="rId8"/>
+    <p:sldId id="270" r:id="rId9"/>
+    <p:sldId id="261" r:id="rId10"/>
+    <p:sldId id="262" r:id="rId11"/>
+    <p:sldId id="263" r:id="rId12"/>
+    <p:sldId id="264" r:id="rId13"/>
+    <p:sldId id="265" r:id="rId14"/>
+    <p:sldId id="266" r:id="rId15"/>
+    <p:sldId id="267" r:id="rId16"/>
   </p:sldIdLst>
   <p:sldSz cx="12192000" cy="6858000"/>
   <p:notesSz cx="6858000" cy="9144000"/>
@@ -115,6 +118,11 @@
       </a:defRPr>
     </a:lvl9pPr>
   </p:defaultTextStyle>
+  <p:extLst>
+    <p:ext uri="{EFAFB233-063F-42B5-8137-9DF3F51BA10A}">
+      <p15:sldGuideLst xmlns:p15="http://schemas.microsoft.com/office/powerpoint/2012/main"/>
+    </p:ext>
+  </p:extLst>
 </p:presentation>
 </file>
 
@@ -3417,6 +3425,204 @@
       </p:grpSpPr>
       <p:pic>
         <p:nvPicPr>
+          <p:cNvPr id="3" name="Picture 2" descr="Graphical user interface&#10;&#10;Description automatically generated with medium confidence">
+            <a:extLst>
+              <a:ext uri="{FF2B5EF4-FFF2-40B4-BE49-F238E27FC236}">
+                <a16:creationId xmlns:a16="http://schemas.microsoft.com/office/drawing/2014/main" id="{4802E230-6181-D426-7979-BB594C07D792}"/>
+              </a:ext>
+            </a:extLst>
+          </p:cNvPr>
+          <p:cNvPicPr>
+            <a:picLocks noChangeAspect="1"/>
+          </p:cNvPicPr>
+          <p:nvPr/>
+        </p:nvPicPr>
+        <p:blipFill>
+          <a:blip r:embed="rId2">
+            <a:extLst>
+              <a:ext uri="{28A0092B-C50C-407E-A947-70E740481C1C}">
+                <a14:useLocalDpi xmlns:a14="http://schemas.microsoft.com/office/drawing/2010/main" val="0"/>
+              </a:ext>
+            </a:extLst>
+          </a:blip>
+          <a:stretch>
+            <a:fillRect/>
+          </a:stretch>
+        </p:blipFill>
+        <p:spPr>
+          <a:xfrm>
+            <a:off x="2879668" y="0"/>
+            <a:ext cx="6432664" cy="6858000"/>
+          </a:xfrm>
+          <a:prstGeom prst="rect">
+            <a:avLst/>
+          </a:prstGeom>
+        </p:spPr>
+      </p:pic>
+    </p:spTree>
+    <p:extLst>
+      <p:ext uri="{BB962C8B-B14F-4D97-AF65-F5344CB8AC3E}">
+        <p14:creationId xmlns:p14="http://schemas.microsoft.com/office/powerpoint/2010/main" val="3841550320"/>
+      </p:ext>
+    </p:extLst>
+  </p:cSld>
+  <p:clrMapOvr>
+    <a:masterClrMapping/>
+  </p:clrMapOvr>
+</p:sld>
+</file>
+
+<file path=ppt/slides/slide11.xml><?xml version="1.0" encoding="utf-8"?>
+<p:sld xmlns:a="http://schemas.openxmlformats.org/drawingml/2006/main" xmlns:r="http://schemas.openxmlformats.org/officeDocument/2006/relationships" xmlns:p="http://schemas.openxmlformats.org/presentationml/2006/main">
+  <p:cSld>
+    <p:spTree>
+      <p:nvGrpSpPr>
+        <p:cNvPr id="1" name=""/>
+        <p:cNvGrpSpPr/>
+        <p:nvPr/>
+      </p:nvGrpSpPr>
+      <p:grpSpPr>
+        <a:xfrm>
+          <a:off x="0" y="0"/>
+          <a:ext cx="0" cy="0"/>
+          <a:chOff x="0" y="0"/>
+          <a:chExt cx="0" cy="0"/>
+        </a:xfrm>
+      </p:grpSpPr>
+      <p:pic>
+        <p:nvPicPr>
+          <p:cNvPr id="3" name="Picture 2" descr="Graphical user interface&#10;&#10;Description automatically generated">
+            <a:extLst>
+              <a:ext uri="{FF2B5EF4-FFF2-40B4-BE49-F238E27FC236}">
+                <a16:creationId xmlns:a16="http://schemas.microsoft.com/office/drawing/2014/main" id="{5766AE1B-5E3B-98A3-C665-858DFA9EABA9}"/>
+              </a:ext>
+            </a:extLst>
+          </p:cNvPr>
+          <p:cNvPicPr>
+            <a:picLocks noChangeAspect="1"/>
+          </p:cNvPicPr>
+          <p:nvPr/>
+        </p:nvPicPr>
+        <p:blipFill>
+          <a:blip r:embed="rId2">
+            <a:extLst>
+              <a:ext uri="{28A0092B-C50C-407E-A947-70E740481C1C}">
+                <a14:useLocalDpi xmlns:a14="http://schemas.microsoft.com/office/drawing/2010/main" val="0"/>
+              </a:ext>
+            </a:extLst>
+          </a:blip>
+          <a:stretch>
+            <a:fillRect/>
+          </a:stretch>
+        </p:blipFill>
+        <p:spPr>
+          <a:xfrm>
+            <a:off x="2879668" y="0"/>
+            <a:ext cx="6432664" cy="6858000"/>
+          </a:xfrm>
+          <a:prstGeom prst="rect">
+            <a:avLst/>
+          </a:prstGeom>
+        </p:spPr>
+      </p:pic>
+    </p:spTree>
+    <p:extLst>
+      <p:ext uri="{BB962C8B-B14F-4D97-AF65-F5344CB8AC3E}">
+        <p14:creationId xmlns:p14="http://schemas.microsoft.com/office/powerpoint/2010/main" val="1705268245"/>
+      </p:ext>
+    </p:extLst>
+  </p:cSld>
+  <p:clrMapOvr>
+    <a:masterClrMapping/>
+  </p:clrMapOvr>
+</p:sld>
+</file>
+
+<file path=ppt/slides/slide12.xml><?xml version="1.0" encoding="utf-8"?>
+<p:sld xmlns:a="http://schemas.openxmlformats.org/drawingml/2006/main" xmlns:r="http://schemas.openxmlformats.org/officeDocument/2006/relationships" xmlns:p="http://schemas.openxmlformats.org/presentationml/2006/main">
+  <p:cSld>
+    <p:spTree>
+      <p:nvGrpSpPr>
+        <p:cNvPr id="1" name=""/>
+        <p:cNvGrpSpPr/>
+        <p:nvPr/>
+      </p:nvGrpSpPr>
+      <p:grpSpPr>
+        <a:xfrm>
+          <a:off x="0" y="0"/>
+          <a:ext cx="0" cy="0"/>
+          <a:chOff x="0" y="0"/>
+          <a:chExt cx="0" cy="0"/>
+        </a:xfrm>
+      </p:grpSpPr>
+      <p:pic>
+        <p:nvPicPr>
+          <p:cNvPr id="3" name="Picture 2" descr="Chart, line chart&#10;&#10;Description automatically generated">
+            <a:extLst>
+              <a:ext uri="{FF2B5EF4-FFF2-40B4-BE49-F238E27FC236}">
+                <a16:creationId xmlns:a16="http://schemas.microsoft.com/office/drawing/2014/main" id="{02C15916-542C-978A-0568-640595D3846A}"/>
+              </a:ext>
+            </a:extLst>
+          </p:cNvPr>
+          <p:cNvPicPr>
+            <a:picLocks noChangeAspect="1"/>
+          </p:cNvPicPr>
+          <p:nvPr/>
+        </p:nvPicPr>
+        <p:blipFill>
+          <a:blip r:embed="rId2">
+            <a:extLst>
+              <a:ext uri="{28A0092B-C50C-407E-A947-70E740481C1C}">
+                <a14:useLocalDpi xmlns:a14="http://schemas.microsoft.com/office/drawing/2010/main" val="0"/>
+              </a:ext>
+            </a:extLst>
+          </a:blip>
+          <a:stretch>
+            <a:fillRect/>
+          </a:stretch>
+        </p:blipFill>
+        <p:spPr>
+          <a:xfrm>
+            <a:off x="0" y="339577"/>
+            <a:ext cx="12192000" cy="6178845"/>
+          </a:xfrm>
+          <a:prstGeom prst="rect">
+            <a:avLst/>
+          </a:prstGeom>
+        </p:spPr>
+      </p:pic>
+    </p:spTree>
+    <p:extLst>
+      <p:ext uri="{BB962C8B-B14F-4D97-AF65-F5344CB8AC3E}">
+        <p14:creationId xmlns:p14="http://schemas.microsoft.com/office/powerpoint/2010/main" val="1549384176"/>
+      </p:ext>
+    </p:extLst>
+  </p:cSld>
+  <p:clrMapOvr>
+    <a:masterClrMapping/>
+  </p:clrMapOvr>
+</p:sld>
+</file>
+
+<file path=ppt/slides/slide13.xml><?xml version="1.0" encoding="utf-8"?>
+<p:sld xmlns:a="http://schemas.openxmlformats.org/drawingml/2006/main" xmlns:r="http://schemas.openxmlformats.org/officeDocument/2006/relationships" xmlns:p="http://schemas.openxmlformats.org/presentationml/2006/main">
+  <p:cSld>
+    <p:spTree>
+      <p:nvGrpSpPr>
+        <p:cNvPr id="1" name=""/>
+        <p:cNvGrpSpPr/>
+        <p:nvPr/>
+      </p:nvGrpSpPr>
+      <p:grpSpPr>
+        <a:xfrm>
+          <a:off x="0" y="0"/>
+          <a:ext cx="0" cy="0"/>
+          <a:chOff x="0" y="0"/>
+          <a:chExt cx="0" cy="0"/>
+        </a:xfrm>
+      </p:grpSpPr>
+      <p:pic>
+        <p:nvPicPr>
           <p:cNvPr id="3" name="Picture 2" descr="Chart, histogram&#10;&#10;Description automatically generated">
             <a:extLst>
               <a:ext uri="{FF2B5EF4-FFF2-40B4-BE49-F238E27FC236}">
@@ -3464,7 +3670,7 @@
 </p:sld>
 </file>
 
-<file path=ppt/slides/slide11.xml><?xml version="1.0" encoding="utf-8"?>
+<file path=ppt/slides/slide14.xml><?xml version="1.0" encoding="utf-8"?>
 <p:sld xmlns:a="http://schemas.openxmlformats.org/drawingml/2006/main" xmlns:r="http://schemas.openxmlformats.org/officeDocument/2006/relationships" xmlns:p="http://schemas.openxmlformats.org/presentationml/2006/main">
   <p:cSld>
     <p:spTree>
@@ -3530,7 +3736,7 @@
 </p:sld>
 </file>
 
-<file path=ppt/slides/slide12.xml><?xml version="1.0" encoding="utf-8"?>
+<file path=ppt/slides/slide15.xml><?xml version="1.0" encoding="utf-8"?>
 <p:sld xmlns:a="http://schemas.openxmlformats.org/drawingml/2006/main" xmlns:r="http://schemas.openxmlformats.org/officeDocument/2006/relationships" xmlns:p="http://schemas.openxmlformats.org/presentationml/2006/main">
   <p:cSld>
     <p:spTree>
@@ -3613,10 +3819,86 @@
           <a:chExt cx="0" cy="0"/>
         </a:xfrm>
       </p:grpSpPr>
+      <p:sp>
+        <p:nvSpPr>
+          <p:cNvPr id="2" name="Title 1">
+            <a:extLst>
+              <a:ext uri="{FF2B5EF4-FFF2-40B4-BE49-F238E27FC236}">
+                <a16:creationId xmlns:a16="http://schemas.microsoft.com/office/drawing/2014/main" id="{7985DAE8-7B65-F220-02F5-B04656A05FF2}"/>
+              </a:ext>
+            </a:extLst>
+          </p:cNvPr>
+          <p:cNvSpPr>
+            <a:spLocks noGrp="1"/>
+          </p:cNvSpPr>
+          <p:nvPr>
+            <p:ph type="title"/>
+          </p:nvPr>
+        </p:nvSpPr>
+        <p:spPr/>
+        <p:txBody>
+          <a:bodyPr/>
+          <a:lstStyle/>
+          <a:p>
+            <a:r>
+              <a:rPr lang="en-US" dirty="0"/>
+              <a:t>Summary of Companies Selected</a:t>
+            </a:r>
+          </a:p>
+        </p:txBody>
+      </p:sp>
+      <p:sp>
+        <p:nvSpPr>
+          <p:cNvPr id="3" name="Content Placeholder 2">
+            <a:extLst>
+              <a:ext uri="{FF2B5EF4-FFF2-40B4-BE49-F238E27FC236}">
+                <a16:creationId xmlns:a16="http://schemas.microsoft.com/office/drawing/2014/main" id="{4989955C-321D-817E-B0BF-3E99EA013458}"/>
+              </a:ext>
+            </a:extLst>
+          </p:cNvPr>
+          <p:cNvSpPr>
+            <a:spLocks noGrp="1"/>
+          </p:cNvSpPr>
+          <p:nvPr>
+            <p:ph idx="1"/>
+          </p:nvPr>
+        </p:nvSpPr>
+        <p:spPr/>
+        <p:txBody>
+          <a:bodyPr>
+            <a:normAutofit fontScale="70000" lnSpcReduction="20000"/>
+          </a:bodyPr>
+          <a:lstStyle/>
+          <a:p>
+            <a:r>
+              <a:rPr lang="en-US" dirty="0"/>
+              <a:t>Apple (AAPL) designs and sells electronic devices such as the iPhone, iPad, Mac, Apple Watch, Air Pods and Apple TV. The company also offers services such as Apple Music, iCloud, Apple Care, Apple TV+, Apple Arcade, Apple Card and Apple Pay. The integrated hardware, software and services are sold in company-owned stores or third-party retailers.</a:t>
+            </a:r>
+          </a:p>
+          <a:p>
+            <a:endParaRPr lang="en-US" dirty="0"/>
+          </a:p>
+          <a:p>
+            <a:r>
+              <a:rPr lang="en-US" dirty="0"/>
+              <a:t>Alphabet (GOOG) is a holding company for the internet giant Google where most of the revenue (85%) is from online ads. Other revenue is from the sales of apps, Google Pay, YouTube as well as cloud service fees and other licensing revenue. They invest in health (Verily), faster internet (Google Fiber), self-driving cars (Waymo). Operating revenue has been 25% to 30%.</a:t>
+            </a:r>
+          </a:p>
+          <a:p>
+            <a:endParaRPr lang="en-US" dirty="0"/>
+          </a:p>
+          <a:p>
+            <a:r>
+              <a:rPr lang="en-US" dirty="0"/>
+              <a:t>Amazon (AMZN) is a leading online retailer and e-commerce aggregator. Net sales are about $ 386 billion and approximately $ 578 billion in estimated physical/digital online gross merchandise. Retail accounts for 80% of total revenue, 10%-15% for Amazon Web services cloud computing, 5% in advertising services. International sales are strong in Germany, United Kingdom and Japan.</a:t>
+            </a:r>
+          </a:p>
+        </p:txBody>
+      </p:sp>
     </p:spTree>
     <p:extLst>
       <p:ext uri="{BB962C8B-B14F-4D97-AF65-F5344CB8AC3E}">
-        <p14:creationId xmlns:p14="http://schemas.microsoft.com/office/powerpoint/2010/main" val="3125829838"/>
+        <p14:creationId xmlns:p14="http://schemas.microsoft.com/office/powerpoint/2010/main" val="2733002857"/>
       </p:ext>
     </p:extLst>
   </p:cSld>
@@ -3643,10 +3925,40 @@
           <a:chExt cx="0" cy="0"/>
         </a:xfrm>
       </p:grpSpPr>
+      <p:pic>
+        <p:nvPicPr>
+          <p:cNvPr id="2" name="Picture 1">
+            <a:extLst>
+              <a:ext uri="{FF2B5EF4-FFF2-40B4-BE49-F238E27FC236}">
+                <a16:creationId xmlns:a16="http://schemas.microsoft.com/office/drawing/2014/main" id="{5B86F7C7-C4ED-566C-E8DF-229FEE7374B5}"/>
+              </a:ext>
+            </a:extLst>
+          </p:cNvPr>
+          <p:cNvPicPr>
+            <a:picLocks noChangeAspect="1"/>
+          </p:cNvPicPr>
+          <p:nvPr/>
+        </p:nvPicPr>
+        <p:blipFill>
+          <a:blip r:embed="rId2"/>
+          <a:stretch>
+            <a:fillRect/>
+          </a:stretch>
+        </p:blipFill>
+        <p:spPr>
+          <a:xfrm>
+            <a:off x="0" y="256732"/>
+            <a:ext cx="12192000" cy="6344535"/>
+          </a:xfrm>
+          <a:prstGeom prst="rect">
+            <a:avLst/>
+          </a:prstGeom>
+        </p:spPr>
+      </p:pic>
     </p:spTree>
     <p:extLst>
       <p:ext uri="{BB962C8B-B14F-4D97-AF65-F5344CB8AC3E}">
-        <p14:creationId xmlns:p14="http://schemas.microsoft.com/office/powerpoint/2010/main" val="1101428788"/>
+        <p14:creationId xmlns:p14="http://schemas.microsoft.com/office/powerpoint/2010/main" val="3125829838"/>
       </p:ext>
     </p:extLst>
   </p:cSld>
@@ -3673,10 +3985,40 @@
           <a:chExt cx="0" cy="0"/>
         </a:xfrm>
       </p:grpSpPr>
+      <p:pic>
+        <p:nvPicPr>
+          <p:cNvPr id="2" name="Picture 1">
+            <a:extLst>
+              <a:ext uri="{FF2B5EF4-FFF2-40B4-BE49-F238E27FC236}">
+                <a16:creationId xmlns:a16="http://schemas.microsoft.com/office/drawing/2014/main" id="{D4D3650C-3CD0-DD9B-23DA-F2DF4E1617F5}"/>
+              </a:ext>
+            </a:extLst>
+          </p:cNvPr>
+          <p:cNvPicPr>
+            <a:picLocks noChangeAspect="1"/>
+          </p:cNvPicPr>
+          <p:nvPr/>
+        </p:nvPicPr>
+        <p:blipFill>
+          <a:blip r:embed="rId2"/>
+          <a:stretch>
+            <a:fillRect/>
+          </a:stretch>
+        </p:blipFill>
+        <p:spPr>
+          <a:xfrm>
+            <a:off x="0" y="256732"/>
+            <a:ext cx="12192000" cy="6344535"/>
+          </a:xfrm>
+          <a:prstGeom prst="rect">
+            <a:avLst/>
+          </a:prstGeom>
+        </p:spPr>
+      </p:pic>
     </p:spTree>
     <p:extLst>
       <p:ext uri="{BB962C8B-B14F-4D97-AF65-F5344CB8AC3E}">
-        <p14:creationId xmlns:p14="http://schemas.microsoft.com/office/powerpoint/2010/main" val="618202407"/>
+        <p14:creationId xmlns:p14="http://schemas.microsoft.com/office/powerpoint/2010/main" val="1101428788"/>
       </p:ext>
     </p:extLst>
   </p:cSld>
@@ -3703,10 +4045,40 @@
           <a:chExt cx="0" cy="0"/>
         </a:xfrm>
       </p:grpSpPr>
+      <p:pic>
+        <p:nvPicPr>
+          <p:cNvPr id="2" name="Picture 1">
+            <a:extLst>
+              <a:ext uri="{FF2B5EF4-FFF2-40B4-BE49-F238E27FC236}">
+                <a16:creationId xmlns:a16="http://schemas.microsoft.com/office/drawing/2014/main" id="{C46E21AF-926E-37B4-8F0B-1395129ADC05}"/>
+              </a:ext>
+            </a:extLst>
+          </p:cNvPr>
+          <p:cNvPicPr>
+            <a:picLocks noChangeAspect="1"/>
+          </p:cNvPicPr>
+          <p:nvPr/>
+        </p:nvPicPr>
+        <p:blipFill>
+          <a:blip r:embed="rId2"/>
+          <a:stretch>
+            <a:fillRect/>
+          </a:stretch>
+        </p:blipFill>
+        <p:spPr>
+          <a:xfrm>
+            <a:off x="0" y="256732"/>
+            <a:ext cx="12192000" cy="6344535"/>
+          </a:xfrm>
+          <a:prstGeom prst="rect">
+            <a:avLst/>
+          </a:prstGeom>
+        </p:spPr>
+      </p:pic>
     </p:spTree>
     <p:extLst>
       <p:ext uri="{BB962C8B-B14F-4D97-AF65-F5344CB8AC3E}">
-        <p14:creationId xmlns:p14="http://schemas.microsoft.com/office/powerpoint/2010/main" val="2597545788"/>
+        <p14:creationId xmlns:p14="http://schemas.microsoft.com/office/powerpoint/2010/main" val="618202407"/>
       </p:ext>
     </p:extLst>
   </p:cSld>
@@ -3735,10 +4107,10 @@
       </p:grpSpPr>
       <p:pic>
         <p:nvPicPr>
-          <p:cNvPr id="7" name="Picture 6" descr="Graphical user interface&#10;&#10;Description automatically generated">
-            <a:extLst>
-              <a:ext uri="{FF2B5EF4-FFF2-40B4-BE49-F238E27FC236}">
-                <a16:creationId xmlns:a16="http://schemas.microsoft.com/office/drawing/2014/main" id="{B29E9081-2E65-DA26-6640-A63C4DAF8F2B}"/>
+          <p:cNvPr id="2" name="Picture 1">
+            <a:extLst>
+              <a:ext uri="{FF2B5EF4-FFF2-40B4-BE49-F238E27FC236}">
+                <a16:creationId xmlns:a16="http://schemas.microsoft.com/office/drawing/2014/main" id="{3F73AA94-ACDC-08EC-36E9-B8719DB0369F}"/>
               </a:ext>
             </a:extLst>
           </p:cNvPr>
@@ -3748,21 +4120,15 @@
           <p:nvPr/>
         </p:nvPicPr>
         <p:blipFill>
-          <a:blip r:embed="rId2">
-            <a:extLst>
-              <a:ext uri="{28A0092B-C50C-407E-A947-70E740481C1C}">
-                <a14:useLocalDpi xmlns:a14="http://schemas.microsoft.com/office/drawing/2010/main" val="0"/>
-              </a:ext>
-            </a:extLst>
-          </a:blip>
+          <a:blip r:embed="rId2"/>
           <a:stretch>
             <a:fillRect/>
           </a:stretch>
         </p:blipFill>
         <p:spPr>
           <a:xfrm>
-            <a:off x="2879668" y="0"/>
-            <a:ext cx="6432664" cy="6858000"/>
+            <a:off x="0" y="258528"/>
+            <a:ext cx="12192000" cy="6340944"/>
           </a:xfrm>
           <a:prstGeom prst="rect">
             <a:avLst/>
@@ -3772,7 +4138,7 @@
     </p:spTree>
     <p:extLst>
       <p:ext uri="{BB962C8B-B14F-4D97-AF65-F5344CB8AC3E}">
-        <p14:creationId xmlns:p14="http://schemas.microsoft.com/office/powerpoint/2010/main" val="2099185213"/>
+        <p14:creationId xmlns:p14="http://schemas.microsoft.com/office/powerpoint/2010/main" val="2597545788"/>
       </p:ext>
     </p:extLst>
   </p:cSld>
@@ -3801,10 +4167,10 @@
       </p:grpSpPr>
       <p:pic>
         <p:nvPicPr>
-          <p:cNvPr id="3" name="Picture 2" descr="Graphical user interface&#10;&#10;Description automatically generated with medium confidence">
-            <a:extLst>
-              <a:ext uri="{FF2B5EF4-FFF2-40B4-BE49-F238E27FC236}">
-                <a16:creationId xmlns:a16="http://schemas.microsoft.com/office/drawing/2014/main" id="{4802E230-6181-D426-7979-BB594C07D792}"/>
+          <p:cNvPr id="2" name="Picture 1">
+            <a:extLst>
+              <a:ext uri="{FF2B5EF4-FFF2-40B4-BE49-F238E27FC236}">
+                <a16:creationId xmlns:a16="http://schemas.microsoft.com/office/drawing/2014/main" id="{41C7B445-6F7F-6AA0-F7CD-52A50F44C23B}"/>
               </a:ext>
             </a:extLst>
           </p:cNvPr>
@@ -3814,21 +4180,15 @@
           <p:nvPr/>
         </p:nvPicPr>
         <p:blipFill>
-          <a:blip r:embed="rId2">
-            <a:extLst>
-              <a:ext uri="{28A0092B-C50C-407E-A947-70E740481C1C}">
-                <a14:useLocalDpi xmlns:a14="http://schemas.microsoft.com/office/drawing/2010/main" val="0"/>
-              </a:ext>
-            </a:extLst>
-          </a:blip>
+          <a:blip r:embed="rId2"/>
           <a:stretch>
             <a:fillRect/>
           </a:stretch>
         </p:blipFill>
         <p:spPr>
           <a:xfrm>
-            <a:off x="2879668" y="0"/>
-            <a:ext cx="6432664" cy="6858000"/>
+            <a:off x="0" y="258528"/>
+            <a:ext cx="12192000" cy="6340944"/>
           </a:xfrm>
           <a:prstGeom prst="rect">
             <a:avLst/>
@@ -3838,7 +4198,7 @@
     </p:spTree>
     <p:extLst>
       <p:ext uri="{BB962C8B-B14F-4D97-AF65-F5344CB8AC3E}">
-        <p14:creationId xmlns:p14="http://schemas.microsoft.com/office/powerpoint/2010/main" val="3841550320"/>
+        <p14:creationId xmlns:p14="http://schemas.microsoft.com/office/powerpoint/2010/main" val="3781930707"/>
       </p:ext>
     </p:extLst>
   </p:cSld>
@@ -3867,10 +4227,10 @@
       </p:grpSpPr>
       <p:pic>
         <p:nvPicPr>
-          <p:cNvPr id="3" name="Picture 2" descr="Graphical user interface&#10;&#10;Description automatically generated">
-            <a:extLst>
-              <a:ext uri="{FF2B5EF4-FFF2-40B4-BE49-F238E27FC236}">
-                <a16:creationId xmlns:a16="http://schemas.microsoft.com/office/drawing/2014/main" id="{5766AE1B-5E3B-98A3-C665-858DFA9EABA9}"/>
+          <p:cNvPr id="2" name="Picture 1">
+            <a:extLst>
+              <a:ext uri="{FF2B5EF4-FFF2-40B4-BE49-F238E27FC236}">
+                <a16:creationId xmlns:a16="http://schemas.microsoft.com/office/drawing/2014/main" id="{A445F670-3D0E-5790-EA52-9E3B207D93A7}"/>
               </a:ext>
             </a:extLst>
           </p:cNvPr>
@@ -3880,21 +4240,15 @@
           <p:nvPr/>
         </p:nvPicPr>
         <p:blipFill>
-          <a:blip r:embed="rId2">
-            <a:extLst>
-              <a:ext uri="{28A0092B-C50C-407E-A947-70E740481C1C}">
-                <a14:useLocalDpi xmlns:a14="http://schemas.microsoft.com/office/drawing/2010/main" val="0"/>
-              </a:ext>
-            </a:extLst>
-          </a:blip>
+          <a:blip r:embed="rId2"/>
           <a:stretch>
             <a:fillRect/>
           </a:stretch>
         </p:blipFill>
         <p:spPr>
           <a:xfrm>
-            <a:off x="2879668" y="0"/>
-            <a:ext cx="6432664" cy="6858000"/>
+            <a:off x="0" y="258528"/>
+            <a:ext cx="12192000" cy="6340944"/>
           </a:xfrm>
           <a:prstGeom prst="rect">
             <a:avLst/>
@@ -3904,7 +4258,7 @@
     </p:spTree>
     <p:extLst>
       <p:ext uri="{BB962C8B-B14F-4D97-AF65-F5344CB8AC3E}">
-        <p14:creationId xmlns:p14="http://schemas.microsoft.com/office/powerpoint/2010/main" val="1705268245"/>
+        <p14:creationId xmlns:p14="http://schemas.microsoft.com/office/powerpoint/2010/main" val="1742695022"/>
       </p:ext>
     </p:extLst>
   </p:cSld>
@@ -3933,10 +4287,10 @@
       </p:grpSpPr>
       <p:pic>
         <p:nvPicPr>
-          <p:cNvPr id="3" name="Picture 2" descr="Chart, line chart&#10;&#10;Description automatically generated">
-            <a:extLst>
-              <a:ext uri="{FF2B5EF4-FFF2-40B4-BE49-F238E27FC236}">
-                <a16:creationId xmlns:a16="http://schemas.microsoft.com/office/drawing/2014/main" id="{02C15916-542C-978A-0568-640595D3846A}"/>
+          <p:cNvPr id="7" name="Picture 6" descr="Graphical user interface&#10;&#10;Description automatically generated">
+            <a:extLst>
+              <a:ext uri="{FF2B5EF4-FFF2-40B4-BE49-F238E27FC236}">
+                <a16:creationId xmlns:a16="http://schemas.microsoft.com/office/drawing/2014/main" id="{B29E9081-2E65-DA26-6640-A63C4DAF8F2B}"/>
               </a:ext>
             </a:extLst>
           </p:cNvPr>
@@ -3959,8 +4313,8 @@
         </p:blipFill>
         <p:spPr>
           <a:xfrm>
-            <a:off x="0" y="339577"/>
-            <a:ext cx="12192000" cy="6178845"/>
+            <a:off x="2879668" y="0"/>
+            <a:ext cx="6432664" cy="6858000"/>
           </a:xfrm>
           <a:prstGeom prst="rect">
             <a:avLst/>
@@ -3970,7 +4324,7 @@
     </p:spTree>
     <p:extLst>
       <p:ext uri="{BB962C8B-B14F-4D97-AF65-F5344CB8AC3E}">
-        <p14:creationId xmlns:p14="http://schemas.microsoft.com/office/powerpoint/2010/main" val="1549384176"/>
+        <p14:creationId xmlns:p14="http://schemas.microsoft.com/office/powerpoint/2010/main" val="2099185213"/>
       </p:ext>
     </p:extLst>
   </p:cSld>

</xml_diff>